<commit_message>
updated SVM + report
</commit_message>
<xml_diff>
--- a/DOC/FinalProject470_SpaceSomethingOrOther.pptx
+++ b/DOC/FinalProject470_SpaceSomethingOrOther.pptx
@@ -9,14 +9,16 @@
     <p:sldId id="261" r:id="rId3"/>
     <p:sldId id="257" r:id="rId4"/>
     <p:sldId id="263" r:id="rId5"/>
-    <p:sldId id="269" r:id="rId6"/>
-    <p:sldId id="270" r:id="rId7"/>
-    <p:sldId id="264" r:id="rId8"/>
-    <p:sldId id="271" r:id="rId9"/>
-    <p:sldId id="265" r:id="rId10"/>
+    <p:sldId id="270" r:id="rId6"/>
+    <p:sldId id="264" r:id="rId7"/>
+    <p:sldId id="271" r:id="rId8"/>
+    <p:sldId id="265" r:id="rId9"/>
+    <p:sldId id="272" r:id="rId10"/>
     <p:sldId id="266" r:id="rId11"/>
-    <p:sldId id="267" r:id="rId12"/>
-    <p:sldId id="268" r:id="rId13"/>
+    <p:sldId id="273" r:id="rId12"/>
+    <p:sldId id="274" r:id="rId13"/>
+    <p:sldId id="267" r:id="rId14"/>
+    <p:sldId id="268" r:id="rId15"/>
   </p:sldIdLst>
   <p:sldSz cx="12192000" cy="6858000"/>
   <p:notesSz cx="12192000" cy="6858000"/>
@@ -195,7 +197,7 @@
           <a:p>
             <a:fld id="{1D8BD707-D9CF-40AE-B4C6-C98DA3205C09}" type="datetimeFigureOut">
               <a:rPr lang="en-US"/>
-              <a:t>5/3/2024</a:t>
+              <a:t>5/4/2024</a:t>
             </a:fld>
             <a:endParaRPr lang="en-US"/>
           </a:p>
@@ -372,7 +374,7 @@
           <a:p>
             <a:fld id="{1D8BD707-D9CF-40AE-B4C6-C98DA3205C09}" type="datetimeFigureOut">
               <a:rPr lang="en-US"/>
-              <a:t>5/3/2024</a:t>
+              <a:t>5/4/2024</a:t>
             </a:fld>
             <a:endParaRPr lang="en-US"/>
           </a:p>
@@ -586,7 +588,7 @@
           <a:p>
             <a:fld id="{1D8BD707-D9CF-40AE-B4C6-C98DA3205C09}" type="datetimeFigureOut">
               <a:rPr lang="en-US"/>
-              <a:t>5/3/2024</a:t>
+              <a:t>5/4/2024</a:t>
             </a:fld>
             <a:endParaRPr lang="en-US"/>
           </a:p>
@@ -734,7 +736,7 @@
           <a:p>
             <a:fld id="{1D8BD707-D9CF-40AE-B4C6-C98DA3205C09}" type="datetimeFigureOut">
               <a:rPr lang="en-US"/>
-              <a:t>5/3/2024</a:t>
+              <a:t>5/4/2024</a:t>
             </a:fld>
             <a:endParaRPr lang="en-US"/>
           </a:p>
@@ -853,7 +855,7 @@
           <a:p>
             <a:fld id="{1D8BD707-D9CF-40AE-B4C6-C98DA3205C09}" type="datetimeFigureOut">
               <a:rPr lang="en-US"/>
-              <a:t>5/3/2024</a:t>
+              <a:t>5/4/2024</a:t>
             </a:fld>
             <a:endParaRPr lang="en-US"/>
           </a:p>
@@ -1078,7 +1080,7 @@
           <a:p>
             <a:fld id="{1D8BD707-D9CF-40AE-B4C6-C98DA3205C09}" type="datetimeFigureOut">
               <a:rPr lang="en-US"/>
-              <a:t>5/3/2024</a:t>
+              <a:t>5/4/2024</a:t>
             </a:fld>
             <a:endParaRPr lang="en-US"/>
           </a:p>
@@ -1422,6 +1424,10 @@
           </p:nvPr>
         </p:nvSpPr>
         <p:spPr>
+          <a:xfrm>
+            <a:off x="36576" y="24384"/>
+            <a:ext cx="8170545" cy="696594"/>
+          </a:xfrm>
           <a:prstGeom prst="rect">
             <a:avLst/>
           </a:prstGeom>
@@ -1487,8 +1493,8 @@
         </p:nvSpPr>
         <p:spPr>
           <a:xfrm>
-            <a:off x="916938" y="1756893"/>
-            <a:ext cx="4798061" cy="1890261"/>
+            <a:off x="381000" y="762000"/>
+            <a:ext cx="4798061" cy="479618"/>
           </a:xfrm>
           <a:prstGeom prst="rect">
             <a:avLst/>
@@ -1499,81 +1505,6 @@
             <a:spAutoFit/>
           </a:bodyPr>
           <a:lstStyle/>
-          <a:p>
-            <a:pPr marL="240029" indent="-227329">
-              <a:lnSpc>
-                <a:spcPct val="100000"/>
-              </a:lnSpc>
-              <a:spcBef>
-                <a:spcPts val="380"/>
-              </a:spcBef>
-              <a:buFont typeface="Arial"/>
-              <a:buChar char="•"/>
-              <a:tabLst>
-                <a:tab pos="240029" algn="l"/>
-              </a:tabLst>
-            </a:pPr>
-            <a:r>
-              <a:rPr sz="2800" spc="-10" dirty="0">
-                <a:latin typeface="Calibri"/>
-                <a:cs typeface="Calibri"/>
-              </a:rPr>
-              <a:t>Features</a:t>
-            </a:r>
-            <a:r>
-              <a:rPr sz="2800" spc="-60" dirty="0">
-                <a:latin typeface="Calibri"/>
-                <a:cs typeface="Calibri"/>
-              </a:rPr>
-              <a:t> </a:t>
-            </a:r>
-            <a:r>
-              <a:rPr sz="2800" dirty="0">
-                <a:latin typeface="Calibri"/>
-                <a:cs typeface="Calibri"/>
-              </a:rPr>
-              <a:t>and</a:t>
-            </a:r>
-            <a:r>
-              <a:rPr sz="2800" spc="-45" dirty="0">
-                <a:latin typeface="Calibri"/>
-                <a:cs typeface="Calibri"/>
-              </a:rPr>
-              <a:t> </a:t>
-            </a:r>
-            <a:r>
-              <a:rPr sz="2800" dirty="0">
-                <a:latin typeface="Calibri"/>
-                <a:cs typeface="Calibri"/>
-              </a:rPr>
-              <a:t>their</a:t>
-            </a:r>
-            <a:r>
-              <a:rPr sz="2800" spc="-50" dirty="0">
-                <a:latin typeface="Calibri"/>
-                <a:cs typeface="Calibri"/>
-              </a:rPr>
-              <a:t> </a:t>
-            </a:r>
-            <a:r>
-              <a:rPr sz="2800" spc="-10" dirty="0">
-                <a:latin typeface="Calibri"/>
-                <a:cs typeface="Calibri"/>
-              </a:rPr>
-              <a:t>types</a:t>
-            </a:r>
-            <a:r>
-              <a:rPr lang="en-US" sz="2800" spc="-10" dirty="0">
-                <a:latin typeface="Calibri"/>
-                <a:cs typeface="Calibri"/>
-              </a:rPr>
-              <a:t>:</a:t>
-            </a:r>
-            <a:endParaRPr sz="2800" dirty="0">
-              <a:latin typeface="Calibri"/>
-              <a:cs typeface="Calibri"/>
-            </a:endParaRPr>
-          </a:p>
           <a:p>
             <a:pPr marL="240029" indent="-227329">
               <a:lnSpc>
@@ -1588,11 +1519,195 @@
                 <a:tab pos="240029" algn="l"/>
               </a:tabLst>
             </a:pPr>
+            <a:r>
+              <a:rPr lang="en-US" sz="2800" dirty="0">
+                <a:latin typeface="Calibri"/>
+                <a:cs typeface="Calibri"/>
+              </a:rPr>
+              <a:t>Distribution</a:t>
+            </a:r>
+            <a:r>
+              <a:rPr lang="en-US" sz="2800" spc="-40" dirty="0">
+                <a:latin typeface="Calibri"/>
+                <a:cs typeface="Calibri"/>
+              </a:rPr>
+              <a:t> </a:t>
+            </a:r>
+            <a:r>
+              <a:rPr lang="en-US" sz="2800" dirty="0">
+                <a:latin typeface="Calibri"/>
+                <a:cs typeface="Calibri"/>
+              </a:rPr>
+              <a:t>of</a:t>
+            </a:r>
+            <a:r>
+              <a:rPr lang="en-US" sz="2800" spc="-85" dirty="0">
+                <a:latin typeface="Calibri"/>
+                <a:cs typeface="Calibri"/>
+              </a:rPr>
+              <a:t> </a:t>
+            </a:r>
+            <a:r>
+              <a:rPr lang="en-US" sz="2800" spc="-10" dirty="0">
+                <a:latin typeface="Calibri"/>
+                <a:cs typeface="Calibri"/>
+              </a:rPr>
+              <a:t>features:</a:t>
+            </a:r>
             <a:endParaRPr lang="en-US" sz="2800" dirty="0">
               <a:latin typeface="Calibri"/>
               <a:cs typeface="Calibri"/>
             </a:endParaRPr>
           </a:p>
+        </p:txBody>
+      </p:sp>
+      <p:pic>
+        <p:nvPicPr>
+          <p:cNvPr id="5" name="Picture 4">
+            <a:extLst>
+              <a:ext uri="{FF2B5EF4-FFF2-40B4-BE49-F238E27FC236}">
+                <a16:creationId xmlns:a16="http://schemas.microsoft.com/office/drawing/2014/main" id="{B72C4271-D8FF-B93A-7E66-CC1491C76DEB}"/>
+              </a:ext>
+            </a:extLst>
+          </p:cNvPr>
+          <p:cNvPicPr>
+            <a:picLocks noChangeAspect="1"/>
+          </p:cNvPicPr>
+          <p:nvPr/>
+        </p:nvPicPr>
+        <p:blipFill>
+          <a:blip r:embed="rId2"/>
+          <a:stretch>
+            <a:fillRect/>
+          </a:stretch>
+        </p:blipFill>
+        <p:spPr>
+          <a:xfrm>
+            <a:off x="4267200" y="720978"/>
+            <a:ext cx="6096000" cy="6054984"/>
+          </a:xfrm>
+          <a:prstGeom prst="rect">
+            <a:avLst/>
+          </a:prstGeom>
+        </p:spPr>
+      </p:pic>
+    </p:spTree>
+  </p:cSld>
+  <p:clrMapOvr>
+    <a:masterClrMapping/>
+  </p:clrMapOvr>
+</p:sld>
+</file>
+
+<file path=ppt/slides/slide11.xml><?xml version="1.0" encoding="utf-8"?>
+<p:sld xmlns:a="http://schemas.openxmlformats.org/drawingml/2006/main" xmlns:r="http://schemas.openxmlformats.org/officeDocument/2006/relationships" xmlns:p="http://schemas.openxmlformats.org/presentationml/2006/main">
+  <p:cSld>
+    <p:spTree>
+      <p:nvGrpSpPr>
+        <p:cNvPr id="1" name=""/>
+        <p:cNvGrpSpPr/>
+        <p:nvPr/>
+      </p:nvGrpSpPr>
+      <p:grpSpPr>
+        <a:xfrm>
+          <a:off x="0" y="0"/>
+          <a:ext cx="0" cy="0"/>
+          <a:chOff x="0" y="0"/>
+          <a:chExt cx="0" cy="0"/>
+        </a:xfrm>
+      </p:grpSpPr>
+      <p:sp>
+        <p:nvSpPr>
+          <p:cNvPr id="2" name="object 2"/>
+          <p:cNvSpPr txBox="1">
+            <a:spLocks noGrp="1"/>
+          </p:cNvSpPr>
+          <p:nvPr>
+            <p:ph type="title"/>
+          </p:nvPr>
+        </p:nvSpPr>
+        <p:spPr>
+          <a:xfrm>
+            <a:off x="36576" y="24384"/>
+            <a:ext cx="8170545" cy="696594"/>
+          </a:xfrm>
+          <a:prstGeom prst="rect">
+            <a:avLst/>
+          </a:prstGeom>
+        </p:spPr>
+        <p:txBody>
+          <a:bodyPr vert="horz" wrap="square" lIns="0" tIns="13335" rIns="0" bIns="0" rtlCol="0">
+            <a:spAutoFit/>
+          </a:bodyPr>
+          <a:lstStyle/>
+          <a:p>
+            <a:pPr marL="12700">
+              <a:lnSpc>
+                <a:spcPct val="100000"/>
+              </a:lnSpc>
+              <a:spcBef>
+                <a:spcPts val="105"/>
+              </a:spcBef>
+            </a:pPr>
+            <a:r>
+              <a:rPr dirty="0"/>
+              <a:t>DESCRIPTION</a:t>
+            </a:r>
+            <a:r>
+              <a:rPr spc="-110" dirty="0"/>
+              <a:t> </a:t>
+            </a:r>
+            <a:r>
+              <a:rPr dirty="0"/>
+              <a:t>OF</a:t>
+            </a:r>
+            <a:r>
+              <a:rPr spc="-100" dirty="0"/>
+              <a:t> </a:t>
+            </a:r>
+            <a:r>
+              <a:rPr dirty="0"/>
+              <a:t>THE</a:t>
+            </a:r>
+            <a:r>
+              <a:rPr spc="-105" dirty="0"/>
+              <a:t> </a:t>
+            </a:r>
+            <a:r>
+              <a:rPr spc="-30" dirty="0"/>
+              <a:t>FEATURE</a:t>
+            </a:r>
+            <a:r>
+              <a:rPr spc="-90" dirty="0"/>
+              <a:t> </a:t>
+            </a:r>
+            <a:r>
+              <a:rPr spc="-305" dirty="0"/>
+              <a:t>DATA</a:t>
+            </a:r>
+          </a:p>
+        </p:txBody>
+      </p:sp>
+      <p:sp>
+        <p:nvSpPr>
+          <p:cNvPr id="3" name="object 3"/>
+          <p:cNvSpPr txBox="1"/>
+          <p:nvPr/>
+        </p:nvSpPr>
+        <p:spPr>
+          <a:xfrm>
+            <a:off x="381000" y="762000"/>
+            <a:ext cx="4798061" cy="479618"/>
+          </a:xfrm>
+          <a:prstGeom prst="rect">
+            <a:avLst/>
+          </a:prstGeom>
+        </p:spPr>
+        <p:txBody>
+          <a:bodyPr vert="horz" wrap="square" lIns="0" tIns="48260" rIns="0" bIns="0" rtlCol="0">
+            <a:spAutoFit/>
+          </a:bodyPr>
+          <a:lstStyle/>
           <a:p>
             <a:pPr marL="240029" indent="-227329">
               <a:lnSpc>
@@ -1608,123 +1723,83 @@
               </a:tabLst>
             </a:pPr>
             <a:r>
-              <a:rPr sz="2800" dirty="0">
+              <a:rPr lang="en-US" sz="2800" dirty="0">
                 <a:latin typeface="Calibri"/>
                 <a:cs typeface="Calibri"/>
               </a:rPr>
               <a:t>Distribution</a:t>
             </a:r>
             <a:r>
-              <a:rPr sz="2800" spc="-40" dirty="0">
-                <a:latin typeface="Calibri"/>
-                <a:cs typeface="Calibri"/>
-              </a:rPr>
-              <a:t> </a:t>
-            </a:r>
-            <a:r>
-              <a:rPr sz="2800" dirty="0">
+              <a:rPr lang="en-US" sz="2800" spc="-40" dirty="0">
+                <a:latin typeface="Calibri"/>
+                <a:cs typeface="Calibri"/>
+              </a:rPr>
+              <a:t> </a:t>
+            </a:r>
+            <a:r>
+              <a:rPr lang="en-US" sz="2800" dirty="0">
                 <a:latin typeface="Calibri"/>
                 <a:cs typeface="Calibri"/>
               </a:rPr>
               <a:t>of</a:t>
             </a:r>
             <a:r>
-              <a:rPr sz="2800" spc="-90" dirty="0">
-                <a:latin typeface="Calibri"/>
-                <a:cs typeface="Calibri"/>
-              </a:rPr>
-              <a:t> </a:t>
-            </a:r>
-            <a:r>
-              <a:rPr sz="2800" dirty="0">
-                <a:latin typeface="Calibri"/>
-                <a:cs typeface="Calibri"/>
-              </a:rPr>
-              <a:t>each</a:t>
-            </a:r>
-            <a:r>
-              <a:rPr sz="2800" spc="-85" dirty="0">
-                <a:latin typeface="Calibri"/>
-                <a:cs typeface="Calibri"/>
-              </a:rPr>
-              <a:t> </a:t>
-            </a:r>
-            <a:r>
-              <a:rPr sz="2800" spc="-10" dirty="0">
-                <a:latin typeface="Calibri"/>
-                <a:cs typeface="Calibri"/>
-              </a:rPr>
-              <a:t>features</a:t>
+              <a:rPr lang="en-US" sz="2800" spc="-85" dirty="0">
+                <a:latin typeface="Calibri"/>
+                <a:cs typeface="Calibri"/>
+              </a:rPr>
+              <a:t> </a:t>
             </a:r>
             <a:r>
               <a:rPr lang="en-US" sz="2800" spc="-10" dirty="0">
                 <a:latin typeface="Calibri"/>
                 <a:cs typeface="Calibri"/>
               </a:rPr>
-              <a:t>:</a:t>
-            </a:r>
-            <a:endParaRPr sz="2800" dirty="0">
+              <a:t>features:</a:t>
+            </a:r>
+            <a:endParaRPr lang="en-US" sz="2800" dirty="0">
               <a:latin typeface="Calibri"/>
               <a:cs typeface="Calibri"/>
             </a:endParaRPr>
           </a:p>
-          <a:p>
-            <a:pPr marL="697230" lvl="1" indent="-227329">
-              <a:lnSpc>
-                <a:spcPct val="100000"/>
-              </a:lnSpc>
-              <a:spcBef>
-                <a:spcPts val="245"/>
-              </a:spcBef>
-              <a:buFont typeface="Arial"/>
-              <a:buChar char="•"/>
-              <a:tabLst>
-                <a:tab pos="697230" algn="l"/>
-              </a:tabLst>
-            </a:pPr>
-            <a:r>
-              <a:rPr sz="2400" dirty="0">
-                <a:latin typeface="Calibri"/>
-                <a:cs typeface="Calibri"/>
-              </a:rPr>
-              <a:t>Use</a:t>
-            </a:r>
-            <a:r>
-              <a:rPr sz="2400" spc="-50" dirty="0">
-                <a:latin typeface="Calibri"/>
-                <a:cs typeface="Calibri"/>
-              </a:rPr>
-              <a:t> </a:t>
-            </a:r>
-            <a:r>
-              <a:rPr sz="2400" spc="-10" dirty="0">
-                <a:latin typeface="Calibri"/>
-                <a:cs typeface="Calibri"/>
-              </a:rPr>
-              <a:t>appropriate</a:t>
-            </a:r>
-            <a:r>
-              <a:rPr sz="2400" spc="-65" dirty="0">
-                <a:latin typeface="Calibri"/>
-                <a:cs typeface="Calibri"/>
-              </a:rPr>
-              <a:t> </a:t>
-            </a:r>
-            <a:r>
-              <a:rPr sz="2400" spc="-10" dirty="0">
-                <a:latin typeface="Calibri"/>
-                <a:cs typeface="Calibri"/>
-              </a:rPr>
-              <a:t>charts</a:t>
-            </a:r>
-            <a:endParaRPr sz="2400" dirty="0">
-              <a:latin typeface="Calibri"/>
-              <a:cs typeface="Calibri"/>
-            </a:endParaRPr>
-          </a:p>
         </p:txBody>
       </p:sp>
+      <p:pic>
+        <p:nvPicPr>
+          <p:cNvPr id="5" name="Picture 4">
+            <a:extLst>
+              <a:ext uri="{FF2B5EF4-FFF2-40B4-BE49-F238E27FC236}">
+                <a16:creationId xmlns:a16="http://schemas.microsoft.com/office/drawing/2014/main" id="{F8EF7252-56D4-1986-ED0C-2C5D8A2B9E0E}"/>
+              </a:ext>
+            </a:extLst>
+          </p:cNvPr>
+          <p:cNvPicPr>
+            <a:picLocks noChangeAspect="1"/>
+          </p:cNvPicPr>
+          <p:nvPr/>
+        </p:nvPicPr>
+        <p:blipFill>
+          <a:blip r:embed="rId2"/>
+          <a:stretch>
+            <a:fillRect/>
+          </a:stretch>
+        </p:blipFill>
+        <p:spPr>
+          <a:xfrm>
+            <a:off x="4121848" y="762000"/>
+            <a:ext cx="6060578" cy="6019800"/>
+          </a:xfrm>
+          <a:prstGeom prst="rect">
+            <a:avLst/>
+          </a:prstGeom>
+        </p:spPr>
+      </p:pic>
     </p:spTree>
+    <p:extLst>
+      <p:ext uri="{BB962C8B-B14F-4D97-AF65-F5344CB8AC3E}">
+        <p14:creationId xmlns:p14="http://schemas.microsoft.com/office/powerpoint/2010/main" val="3246847894"/>
+      </p:ext>
+    </p:extLst>
   </p:cSld>
   <p:clrMapOvr>
     <a:masterClrMapping/>
@@ -1732,7 +1807,215 @@
 </p:sld>
 </file>
 
-<file path=ppt/slides/slide11.xml><?xml version="1.0" encoding="utf-8"?>
+<file path=ppt/slides/slide12.xml><?xml version="1.0" encoding="utf-8"?>
+<p:sld xmlns:a="http://schemas.openxmlformats.org/drawingml/2006/main" xmlns:r="http://schemas.openxmlformats.org/officeDocument/2006/relationships" xmlns:p="http://schemas.openxmlformats.org/presentationml/2006/main">
+  <p:cSld>
+    <p:spTree>
+      <p:nvGrpSpPr>
+        <p:cNvPr id="1" name=""/>
+        <p:cNvGrpSpPr/>
+        <p:nvPr/>
+      </p:nvGrpSpPr>
+      <p:grpSpPr>
+        <a:xfrm>
+          <a:off x="0" y="0"/>
+          <a:ext cx="0" cy="0"/>
+          <a:chOff x="0" y="0"/>
+          <a:chExt cx="0" cy="0"/>
+        </a:xfrm>
+      </p:grpSpPr>
+      <p:sp>
+        <p:nvSpPr>
+          <p:cNvPr id="2" name="object 2"/>
+          <p:cNvSpPr txBox="1">
+            <a:spLocks noGrp="1"/>
+          </p:cNvSpPr>
+          <p:nvPr>
+            <p:ph type="title"/>
+          </p:nvPr>
+        </p:nvSpPr>
+        <p:spPr>
+          <a:xfrm>
+            <a:off x="36576" y="24384"/>
+            <a:ext cx="8170545" cy="696594"/>
+          </a:xfrm>
+          <a:prstGeom prst="rect">
+            <a:avLst/>
+          </a:prstGeom>
+        </p:spPr>
+        <p:txBody>
+          <a:bodyPr vert="horz" wrap="square" lIns="0" tIns="13335" rIns="0" bIns="0" rtlCol="0">
+            <a:spAutoFit/>
+          </a:bodyPr>
+          <a:lstStyle/>
+          <a:p>
+            <a:pPr marL="12700">
+              <a:lnSpc>
+                <a:spcPct val="100000"/>
+              </a:lnSpc>
+              <a:spcBef>
+                <a:spcPts val="105"/>
+              </a:spcBef>
+            </a:pPr>
+            <a:r>
+              <a:rPr dirty="0"/>
+              <a:t>DESCRIPTION</a:t>
+            </a:r>
+            <a:r>
+              <a:rPr spc="-110" dirty="0"/>
+              <a:t> </a:t>
+            </a:r>
+            <a:r>
+              <a:rPr dirty="0"/>
+              <a:t>OF</a:t>
+            </a:r>
+            <a:r>
+              <a:rPr spc="-100" dirty="0"/>
+              <a:t> </a:t>
+            </a:r>
+            <a:r>
+              <a:rPr dirty="0"/>
+              <a:t>THE</a:t>
+            </a:r>
+            <a:r>
+              <a:rPr spc="-105" dirty="0"/>
+              <a:t> </a:t>
+            </a:r>
+            <a:r>
+              <a:rPr spc="-30" dirty="0"/>
+              <a:t>FEATURE</a:t>
+            </a:r>
+            <a:r>
+              <a:rPr spc="-90" dirty="0"/>
+              <a:t> </a:t>
+            </a:r>
+            <a:r>
+              <a:rPr spc="-305" dirty="0"/>
+              <a:t>DATA</a:t>
+            </a:r>
+          </a:p>
+        </p:txBody>
+      </p:sp>
+      <p:sp>
+        <p:nvSpPr>
+          <p:cNvPr id="3" name="object 3"/>
+          <p:cNvSpPr txBox="1"/>
+          <p:nvPr/>
+        </p:nvSpPr>
+        <p:spPr>
+          <a:xfrm>
+            <a:off x="381000" y="762000"/>
+            <a:ext cx="4798061" cy="479618"/>
+          </a:xfrm>
+          <a:prstGeom prst="rect">
+            <a:avLst/>
+          </a:prstGeom>
+        </p:spPr>
+        <p:txBody>
+          <a:bodyPr vert="horz" wrap="square" lIns="0" tIns="48260" rIns="0" bIns="0" rtlCol="0">
+            <a:spAutoFit/>
+          </a:bodyPr>
+          <a:lstStyle/>
+          <a:p>
+            <a:pPr marL="240029" indent="-227329">
+              <a:lnSpc>
+                <a:spcPct val="100000"/>
+              </a:lnSpc>
+              <a:spcBef>
+                <a:spcPts val="630"/>
+              </a:spcBef>
+              <a:buFont typeface="Arial"/>
+              <a:buChar char="•"/>
+              <a:tabLst>
+                <a:tab pos="240029" algn="l"/>
+              </a:tabLst>
+            </a:pPr>
+            <a:r>
+              <a:rPr lang="en-US" sz="2800" dirty="0">
+                <a:latin typeface="Calibri"/>
+                <a:cs typeface="Calibri"/>
+              </a:rPr>
+              <a:t>Distribution</a:t>
+            </a:r>
+            <a:r>
+              <a:rPr lang="en-US" sz="2800" spc="-40" dirty="0">
+                <a:latin typeface="Calibri"/>
+                <a:cs typeface="Calibri"/>
+              </a:rPr>
+              <a:t> </a:t>
+            </a:r>
+            <a:r>
+              <a:rPr lang="en-US" sz="2800" dirty="0">
+                <a:latin typeface="Calibri"/>
+                <a:cs typeface="Calibri"/>
+              </a:rPr>
+              <a:t>of</a:t>
+            </a:r>
+            <a:r>
+              <a:rPr lang="en-US" sz="2800" spc="-85" dirty="0">
+                <a:latin typeface="Calibri"/>
+                <a:cs typeface="Calibri"/>
+              </a:rPr>
+              <a:t> </a:t>
+            </a:r>
+            <a:r>
+              <a:rPr lang="en-US" sz="2800" spc="-10" dirty="0">
+                <a:latin typeface="Calibri"/>
+                <a:cs typeface="Calibri"/>
+              </a:rPr>
+              <a:t>features:</a:t>
+            </a:r>
+            <a:endParaRPr lang="en-US" sz="2800" dirty="0">
+              <a:latin typeface="Calibri"/>
+              <a:cs typeface="Calibri"/>
+            </a:endParaRPr>
+          </a:p>
+        </p:txBody>
+      </p:sp>
+      <p:pic>
+        <p:nvPicPr>
+          <p:cNvPr id="5" name="Picture 4">
+            <a:extLst>
+              <a:ext uri="{FF2B5EF4-FFF2-40B4-BE49-F238E27FC236}">
+                <a16:creationId xmlns:a16="http://schemas.microsoft.com/office/drawing/2014/main" id="{6DD7569B-5605-7ABB-E274-5E81F2CC3B19}"/>
+              </a:ext>
+            </a:extLst>
+          </p:cNvPr>
+          <p:cNvPicPr>
+            <a:picLocks noChangeAspect="1"/>
+          </p:cNvPicPr>
+          <p:nvPr/>
+        </p:nvPicPr>
+        <p:blipFill>
+          <a:blip r:embed="rId2"/>
+          <a:stretch>
+            <a:fillRect/>
+          </a:stretch>
+        </p:blipFill>
+        <p:spPr>
+          <a:xfrm>
+            <a:off x="4121848" y="762000"/>
+            <a:ext cx="6040125" cy="6004535"/>
+          </a:xfrm>
+          <a:prstGeom prst="rect">
+            <a:avLst/>
+          </a:prstGeom>
+        </p:spPr>
+      </p:pic>
+    </p:spTree>
+    <p:extLst>
+      <p:ext uri="{BB962C8B-B14F-4D97-AF65-F5344CB8AC3E}">
+        <p14:creationId xmlns:p14="http://schemas.microsoft.com/office/powerpoint/2010/main" val="2920329846"/>
+      </p:ext>
+    </p:extLst>
+  </p:cSld>
+  <p:clrMapOvr>
+    <a:masterClrMapping/>
+  </p:clrMapOvr>
+</p:sld>
+</file>
+
+<file path=ppt/slides/slide13.xml><?xml version="1.0" encoding="utf-8"?>
 <p:sld xmlns:a="http://schemas.openxmlformats.org/drawingml/2006/main" xmlns:r="http://schemas.openxmlformats.org/officeDocument/2006/relationships" xmlns:p="http://schemas.openxmlformats.org/presentationml/2006/main" showMasterSp="0">
   <p:cSld>
     <p:spTree>
@@ -2181,7 +2464,7 @@
 </p:sld>
 </file>
 
-<file path=ppt/slides/slide12.xml><?xml version="1.0" encoding="utf-8"?>
+<file path=ppt/slides/slide14.xml><?xml version="1.0" encoding="utf-8"?>
 <p:sld xmlns:a="http://schemas.openxmlformats.org/drawingml/2006/main" xmlns:r="http://schemas.openxmlformats.org/officeDocument/2006/relationships" xmlns:p="http://schemas.openxmlformats.org/presentationml/2006/main" showMasterSp="0">
   <p:cSld>
     <p:spTree>
@@ -4182,7 +4465,7 @@
         <p:spPr>
           <a:xfrm>
             <a:off x="1371600" y="2209800"/>
-            <a:ext cx="7086600" cy="2554545"/>
+            <a:ext cx="7086600" cy="3170099"/>
           </a:xfrm>
           <a:prstGeom prst="rect">
             <a:avLst/>
@@ -4201,16 +4484,18 @@
                 <a:ea typeface="Calibri Light" panose="020F0302020204030204" pitchFamily="34" charset="0"/>
                 <a:cs typeface="Calibri Light" panose="020F0302020204030204" pitchFamily="34" charset="0"/>
               </a:rPr>
-              <a:t>Brooks Schafer</a:t>
-            </a:r>
-          </a:p>
-          <a:p>
-            <a:pPr lvl="2"/>
-            <a:endParaRPr lang="en-US" sz="4000" dirty="0">
-              <a:latin typeface="+mn-lt"/>
-              <a:ea typeface="Calibri Light" panose="020F0302020204030204" pitchFamily="34" charset="0"/>
-              <a:cs typeface="Calibri Light" panose="020F0302020204030204" pitchFamily="34" charset="0"/>
-            </a:endParaRPr>
+              <a:t>Brooks Schafer:</a:t>
+            </a:r>
+          </a:p>
+          <a:p>
+            <a:r>
+              <a:rPr lang="en-US" sz="4000" dirty="0">
+                <a:latin typeface="+mn-lt"/>
+                <a:ea typeface="Calibri Light" panose="020F0302020204030204" pitchFamily="34" charset="0"/>
+                <a:cs typeface="Calibri Light" panose="020F0302020204030204" pitchFamily="34" charset="0"/>
+              </a:rPr>
+              <a:t>	-Coding, emotional support</a:t>
+            </a:r>
           </a:p>
           <a:p>
             <a:pPr lvl="1"/>
@@ -4228,7 +4513,18 @@
                 <a:ea typeface="Calibri Light" panose="020F0302020204030204" pitchFamily="34" charset="0"/>
                 <a:cs typeface="Calibri Light" panose="020F0302020204030204" pitchFamily="34" charset="0"/>
               </a:rPr>
-              <a:t>Melinda McElveen</a:t>
+              <a:t>Melinda McElveen:</a:t>
+            </a:r>
+          </a:p>
+          <a:p>
+            <a:pPr lvl="2"/>
+            <a:r>
+              <a:rPr lang="en-US" sz="4000" dirty="0">
+                <a:latin typeface="+mn-lt"/>
+                <a:ea typeface="Calibri Light" panose="020F0302020204030204" pitchFamily="34" charset="0"/>
+                <a:cs typeface="Calibri Light" panose="020F0302020204030204" pitchFamily="34" charset="0"/>
+              </a:rPr>
+              <a:t>	-Coding, emotional support</a:t>
             </a:r>
           </a:p>
         </p:txBody>
@@ -5815,8 +6111,8 @@
         </p:nvSpPr>
         <p:spPr>
           <a:xfrm>
-            <a:off x="838200" y="1524000"/>
-            <a:ext cx="6781800" cy="2723823"/>
+            <a:off x="228600" y="838200"/>
+            <a:ext cx="6781800" cy="1708160"/>
           </a:xfrm>
           <a:prstGeom prst="rect">
             <a:avLst/>
@@ -5844,275 +6140,7 @@
             </a:pPr>
             <a:r>
               <a:rPr lang="en-US" sz="2800" dirty="0"/>
-              <a:t>Distribution</a:t>
-            </a:r>
-            <a:r>
-              <a:rPr lang="en-US" sz="2800" spc="-40" dirty="0"/>
-              <a:t> </a:t>
-            </a:r>
-            <a:r>
-              <a:rPr lang="en-US" sz="2800" dirty="0"/>
-              <a:t>of</a:t>
-            </a:r>
-            <a:r>
-              <a:rPr lang="en-US" sz="2800" spc="-80" dirty="0"/>
-              <a:t> </a:t>
-            </a:r>
-            <a:r>
-              <a:rPr lang="en-US" sz="2800" dirty="0"/>
-              <a:t>values</a:t>
-            </a:r>
-            <a:r>
-              <a:rPr lang="en-US" sz="2800" spc="-80" dirty="0"/>
-              <a:t> </a:t>
-            </a:r>
-            <a:r>
-              <a:rPr lang="en-US" sz="2800" dirty="0"/>
-              <a:t>for</a:t>
-            </a:r>
-            <a:r>
-              <a:rPr lang="en-US" sz="2800" spc="-85" dirty="0"/>
-              <a:t> </a:t>
-            </a:r>
-            <a:r>
-              <a:rPr lang="en-US" sz="2800" dirty="0"/>
-              <a:t>each</a:t>
-            </a:r>
-            <a:r>
-              <a:rPr lang="en-US" sz="2800" spc="-90" dirty="0"/>
-              <a:t> </a:t>
-            </a:r>
-            <a:r>
-              <a:rPr lang="en-US" sz="2800" spc="-10" dirty="0"/>
-              <a:t>attribute:</a:t>
-            </a:r>
-          </a:p>
-          <a:p>
-            <a:pPr marL="12700" lvl="1">
-              <a:spcBef>
-                <a:spcPts val="645"/>
-              </a:spcBef>
-              <a:tabLst>
-                <a:tab pos="240029" algn="l"/>
-              </a:tabLst>
-            </a:pPr>
-            <a:r>
-              <a:rPr lang="en-US" sz="2800" spc="-10" dirty="0"/>
-              <a:t>                 use appropriate charts</a:t>
-            </a:r>
-          </a:p>
-          <a:p>
-            <a:pPr marL="12700" lvl="1">
-              <a:spcBef>
-                <a:spcPts val="645"/>
-              </a:spcBef>
-              <a:tabLst>
-                <a:tab pos="240029" algn="l"/>
-              </a:tabLst>
-            </a:pPr>
-            <a:endParaRPr lang="en-US" sz="2800" spc="-10" dirty="0"/>
-          </a:p>
-          <a:p>
-            <a:pPr marL="469901" lvl="1">
-              <a:lnSpc>
-                <a:spcPct val="100000"/>
-              </a:lnSpc>
-              <a:spcBef>
-                <a:spcPts val="229"/>
-              </a:spcBef>
-              <a:tabLst>
-                <a:tab pos="697230" algn="l"/>
-              </a:tabLst>
-            </a:pPr>
-            <a:endParaRPr lang="en-US" sz="2400" dirty="0">
-              <a:latin typeface="Calibri"/>
-              <a:cs typeface="Calibri"/>
-            </a:endParaRPr>
-          </a:p>
-          <a:p>
-            <a:pPr marL="469901" lvl="1">
-              <a:lnSpc>
-                <a:spcPct val="100000"/>
-              </a:lnSpc>
-              <a:spcBef>
-                <a:spcPts val="229"/>
-              </a:spcBef>
-              <a:tabLst>
-                <a:tab pos="697230" algn="l"/>
-              </a:tabLst>
-            </a:pPr>
-            <a:endParaRPr lang="en-US" sz="2400" dirty="0">
-              <a:latin typeface="Calibri"/>
-              <a:cs typeface="Calibri"/>
-            </a:endParaRPr>
-          </a:p>
-          <a:p>
-            <a:pPr marL="697230" lvl="1" indent="-227329">
-              <a:lnSpc>
-                <a:spcPct val="100000"/>
-              </a:lnSpc>
-              <a:spcBef>
-                <a:spcPts val="229"/>
-              </a:spcBef>
-              <a:buFont typeface="Arial"/>
-              <a:buChar char="•"/>
-              <a:tabLst>
-                <a:tab pos="697230" algn="l"/>
-              </a:tabLst>
-            </a:pPr>
-            <a:endParaRPr lang="en-US" sz="2400" dirty="0">
-              <a:latin typeface="Calibri"/>
-              <a:cs typeface="Calibri"/>
-            </a:endParaRPr>
-          </a:p>
-        </p:txBody>
-      </p:sp>
-    </p:spTree>
-    <p:extLst>
-      <p:ext uri="{BB962C8B-B14F-4D97-AF65-F5344CB8AC3E}">
-        <p14:creationId xmlns:p14="http://schemas.microsoft.com/office/powerpoint/2010/main" val="3304334761"/>
-      </p:ext>
-    </p:extLst>
-  </p:cSld>
-  <p:clrMapOvr>
-    <a:masterClrMapping/>
-  </p:clrMapOvr>
-</p:sld>
-</file>
-
-<file path=ppt/slides/slide6.xml><?xml version="1.0" encoding="utf-8"?>
-<p:sld xmlns:a="http://schemas.openxmlformats.org/drawingml/2006/main" xmlns:r="http://schemas.openxmlformats.org/officeDocument/2006/relationships" xmlns:p="http://schemas.openxmlformats.org/presentationml/2006/main">
-  <p:cSld>
-    <p:spTree>
-      <p:nvGrpSpPr>
-        <p:cNvPr id="1" name=""/>
-        <p:cNvGrpSpPr/>
-        <p:nvPr/>
-      </p:nvGrpSpPr>
-      <p:grpSpPr>
-        <a:xfrm>
-          <a:off x="0" y="0"/>
-          <a:ext cx="0" cy="0"/>
-          <a:chOff x="0" y="0"/>
-          <a:chExt cx="0" cy="0"/>
-        </a:xfrm>
-      </p:grpSpPr>
-      <p:sp>
-        <p:nvSpPr>
-          <p:cNvPr id="2" name="object 2"/>
-          <p:cNvSpPr txBox="1">
-            <a:spLocks noGrp="1"/>
-          </p:cNvSpPr>
-          <p:nvPr>
-            <p:ph type="title"/>
-          </p:nvPr>
-        </p:nvSpPr>
-        <p:spPr>
-          <a:xfrm>
-            <a:off x="27432" y="16022"/>
-            <a:ext cx="8170545" cy="696594"/>
-          </a:xfrm>
-          <a:prstGeom prst="rect">
-            <a:avLst/>
-          </a:prstGeom>
-        </p:spPr>
-        <p:txBody>
-          <a:bodyPr vert="horz" wrap="square" lIns="0" tIns="13335" rIns="0" bIns="0" rtlCol="0">
-            <a:spAutoFit/>
-          </a:bodyPr>
-          <a:lstStyle/>
-          <a:p>
-            <a:pPr marL="12700">
-              <a:lnSpc>
-                <a:spcPct val="100000"/>
-              </a:lnSpc>
-              <a:spcBef>
-                <a:spcPts val="105"/>
-              </a:spcBef>
-            </a:pPr>
-            <a:r>
-              <a:rPr dirty="0"/>
-              <a:t>DESCRIPTION</a:t>
-            </a:r>
-            <a:r>
-              <a:rPr spc="-100" dirty="0"/>
-              <a:t> </a:t>
-            </a:r>
-            <a:r>
-              <a:rPr dirty="0"/>
-              <a:t>OF</a:t>
-            </a:r>
-            <a:r>
-              <a:rPr spc="-95" dirty="0"/>
-              <a:t> </a:t>
-            </a:r>
-            <a:r>
-              <a:rPr dirty="0"/>
-              <a:t>THE</a:t>
-            </a:r>
-            <a:r>
-              <a:rPr spc="-95" dirty="0"/>
-              <a:t> </a:t>
-            </a:r>
-            <a:r>
-              <a:rPr dirty="0"/>
-              <a:t>RAW</a:t>
-            </a:r>
-            <a:r>
-              <a:rPr spc="-105" dirty="0"/>
-              <a:t> </a:t>
-            </a:r>
-            <a:r>
-              <a:rPr spc="-305" dirty="0"/>
-              <a:t>DATA</a:t>
-            </a:r>
-          </a:p>
-        </p:txBody>
-      </p:sp>
-      <p:sp>
-        <p:nvSpPr>
-          <p:cNvPr id="22" name="TextBox 21">
-            <a:extLst>
-              <a:ext uri="{FF2B5EF4-FFF2-40B4-BE49-F238E27FC236}">
-                <a16:creationId xmlns:a16="http://schemas.microsoft.com/office/drawing/2014/main" id="{F460E116-D58F-6796-FBA1-66A6A49A3F91}"/>
-              </a:ext>
-            </a:extLst>
-          </p:cNvPr>
-          <p:cNvSpPr txBox="1"/>
-          <p:nvPr/>
-        </p:nvSpPr>
-        <p:spPr>
-          <a:xfrm>
-            <a:off x="228600" y="838200"/>
-            <a:ext cx="6781800" cy="1708160"/>
-          </a:xfrm>
-          <a:prstGeom prst="rect">
-            <a:avLst/>
-          </a:prstGeom>
-          <a:noFill/>
-        </p:spPr>
-        <p:txBody>
-          <a:bodyPr wrap="square">
-            <a:spAutoFit/>
-          </a:bodyPr>
-          <a:lstStyle/>
-          <a:p>
-            <a:pPr marL="240029" indent="-227329">
-              <a:lnSpc>
-                <a:spcPct val="100000"/>
-              </a:lnSpc>
-              <a:spcBef>
-                <a:spcPts val="645"/>
-              </a:spcBef>
-              <a:buFont typeface="Arial"/>
-              <a:buChar char="•"/>
-              <a:tabLst>
-                <a:tab pos="240029" algn="l"/>
-              </a:tabLst>
-            </a:pPr>
-            <a:r>
-              <a:rPr lang="en-US" sz="2800" dirty="0"/>
-              <a:t>Raw data stream examples:</a:t>
+              <a:t>Distribution of values examples:</a:t>
             </a:r>
             <a:endParaRPr lang="en-US" sz="2400" dirty="0">
               <a:latin typeface="Calibri"/>
@@ -6217,7 +6245,7 @@
 </p:sld>
 </file>
 
-<file path=ppt/slides/slide7.xml><?xml version="1.0" encoding="utf-8"?>
+<file path=ppt/slides/slide6.xml><?xml version="1.0" encoding="utf-8"?>
 <p:sld xmlns:a="http://schemas.openxmlformats.org/drawingml/2006/main" xmlns:r="http://schemas.openxmlformats.org/officeDocument/2006/relationships" xmlns:p="http://schemas.openxmlformats.org/presentationml/2006/main" showMasterSp="0">
   <p:cSld>
     <p:spTree>
@@ -6669,7 +6697,7 @@
 </p:sld>
 </file>
 
-<file path=ppt/slides/slide8.xml><?xml version="1.0" encoding="utf-8"?>
+<file path=ppt/slides/slide7.xml><?xml version="1.0" encoding="utf-8"?>
 <p:sld xmlns:a="http://schemas.openxmlformats.org/drawingml/2006/main" xmlns:r="http://schemas.openxmlformats.org/officeDocument/2006/relationships" xmlns:p="http://schemas.openxmlformats.org/presentationml/2006/main">
   <p:cSld>
     <p:spTree>
@@ -6820,7 +6848,7 @@
 </p:sld>
 </file>
 
-<file path=ppt/slides/slide9.xml><?xml version="1.0" encoding="utf-8"?>
+<file path=ppt/slides/slide8.xml><?xml version="1.0" encoding="utf-8"?>
 <p:sld xmlns:a="http://schemas.openxmlformats.org/drawingml/2006/main" xmlns:r="http://schemas.openxmlformats.org/officeDocument/2006/relationships" xmlns:p="http://schemas.openxmlformats.org/presentationml/2006/main" showMasterSp="0">
   <p:cSld>
     <p:spTree>
@@ -6994,6 +7022,1401 @@
         </p:spPr>
       </p:pic>
     </p:spTree>
+  </p:cSld>
+  <p:clrMapOvr>
+    <a:masterClrMapping/>
+  </p:clrMapOvr>
+</p:sld>
+</file>
+
+<file path=ppt/slides/slide9.xml><?xml version="1.0" encoding="utf-8"?>
+<p:sld xmlns:a="http://schemas.openxmlformats.org/drawingml/2006/main" xmlns:r="http://schemas.openxmlformats.org/officeDocument/2006/relationships" xmlns:p="http://schemas.openxmlformats.org/presentationml/2006/main">
+  <p:cSld>
+    <p:spTree>
+      <p:nvGrpSpPr>
+        <p:cNvPr id="1" name=""/>
+        <p:cNvGrpSpPr/>
+        <p:nvPr/>
+      </p:nvGrpSpPr>
+      <p:grpSpPr>
+        <a:xfrm>
+          <a:off x="0" y="0"/>
+          <a:ext cx="0" cy="0"/>
+          <a:chOff x="0" y="0"/>
+          <a:chExt cx="0" cy="0"/>
+        </a:xfrm>
+      </p:grpSpPr>
+      <p:sp>
+        <p:nvSpPr>
+          <p:cNvPr id="2" name="object 2"/>
+          <p:cNvSpPr txBox="1">
+            <a:spLocks noGrp="1"/>
+          </p:cNvSpPr>
+          <p:nvPr>
+            <p:ph type="title"/>
+          </p:nvPr>
+        </p:nvSpPr>
+        <p:spPr>
+          <a:xfrm>
+            <a:off x="76200" y="76200"/>
+            <a:ext cx="8170545" cy="696594"/>
+          </a:xfrm>
+          <a:prstGeom prst="rect">
+            <a:avLst/>
+          </a:prstGeom>
+        </p:spPr>
+        <p:txBody>
+          <a:bodyPr vert="horz" wrap="square" lIns="0" tIns="13335" rIns="0" bIns="0" rtlCol="0">
+            <a:spAutoFit/>
+          </a:bodyPr>
+          <a:lstStyle/>
+          <a:p>
+            <a:pPr marL="12700">
+              <a:lnSpc>
+                <a:spcPct val="100000"/>
+              </a:lnSpc>
+              <a:spcBef>
+                <a:spcPts val="105"/>
+              </a:spcBef>
+            </a:pPr>
+            <a:r>
+              <a:rPr dirty="0"/>
+              <a:t>DESCRIPTION</a:t>
+            </a:r>
+            <a:r>
+              <a:rPr spc="-110" dirty="0"/>
+              <a:t> </a:t>
+            </a:r>
+            <a:r>
+              <a:rPr dirty="0"/>
+              <a:t>OF</a:t>
+            </a:r>
+            <a:r>
+              <a:rPr spc="-100" dirty="0"/>
+              <a:t> </a:t>
+            </a:r>
+            <a:r>
+              <a:rPr dirty="0"/>
+              <a:t>THE</a:t>
+            </a:r>
+            <a:r>
+              <a:rPr spc="-105" dirty="0"/>
+              <a:t> </a:t>
+            </a:r>
+            <a:r>
+              <a:rPr spc="-30" dirty="0"/>
+              <a:t>FEATURE</a:t>
+            </a:r>
+            <a:r>
+              <a:rPr spc="-90" dirty="0"/>
+              <a:t> </a:t>
+            </a:r>
+            <a:r>
+              <a:rPr spc="-305" dirty="0"/>
+              <a:t>DATA</a:t>
+            </a:r>
+          </a:p>
+        </p:txBody>
+      </p:sp>
+      <p:sp>
+        <p:nvSpPr>
+          <p:cNvPr id="3" name="object 3"/>
+          <p:cNvSpPr txBox="1"/>
+          <p:nvPr/>
+        </p:nvSpPr>
+        <p:spPr>
+          <a:xfrm>
+            <a:off x="1007109" y="1133671"/>
+            <a:ext cx="4798061" cy="479618"/>
+          </a:xfrm>
+          <a:prstGeom prst="rect">
+            <a:avLst/>
+          </a:prstGeom>
+        </p:spPr>
+        <p:txBody>
+          <a:bodyPr vert="horz" wrap="square" lIns="0" tIns="48260" rIns="0" bIns="0" rtlCol="0">
+            <a:spAutoFit/>
+          </a:bodyPr>
+          <a:lstStyle/>
+          <a:p>
+            <a:pPr marL="240029" indent="-227329">
+              <a:lnSpc>
+                <a:spcPct val="100000"/>
+              </a:lnSpc>
+              <a:spcBef>
+                <a:spcPts val="380"/>
+              </a:spcBef>
+              <a:buFont typeface="Arial"/>
+              <a:buChar char="•"/>
+              <a:tabLst>
+                <a:tab pos="240029" algn="l"/>
+              </a:tabLst>
+            </a:pPr>
+            <a:r>
+              <a:rPr sz="2800" spc="-10" dirty="0">
+                <a:latin typeface="Calibri"/>
+                <a:cs typeface="Calibri"/>
+              </a:rPr>
+              <a:t>Features</a:t>
+            </a:r>
+            <a:r>
+              <a:rPr sz="2800" spc="-60" dirty="0">
+                <a:latin typeface="Calibri"/>
+                <a:cs typeface="Calibri"/>
+              </a:rPr>
+              <a:t> </a:t>
+            </a:r>
+            <a:r>
+              <a:rPr sz="2800" dirty="0">
+                <a:latin typeface="Calibri"/>
+                <a:cs typeface="Calibri"/>
+              </a:rPr>
+              <a:t>and</a:t>
+            </a:r>
+            <a:r>
+              <a:rPr sz="2800" spc="-45" dirty="0">
+                <a:latin typeface="Calibri"/>
+                <a:cs typeface="Calibri"/>
+              </a:rPr>
+              <a:t> </a:t>
+            </a:r>
+            <a:r>
+              <a:rPr sz="2800" dirty="0">
+                <a:latin typeface="Calibri"/>
+                <a:cs typeface="Calibri"/>
+              </a:rPr>
+              <a:t>their</a:t>
+            </a:r>
+            <a:r>
+              <a:rPr sz="2800" spc="-50" dirty="0">
+                <a:latin typeface="Calibri"/>
+                <a:cs typeface="Calibri"/>
+              </a:rPr>
+              <a:t> </a:t>
+            </a:r>
+            <a:r>
+              <a:rPr sz="2800" spc="-10" dirty="0">
+                <a:latin typeface="Calibri"/>
+                <a:cs typeface="Calibri"/>
+              </a:rPr>
+              <a:t>types</a:t>
+            </a:r>
+            <a:r>
+              <a:rPr lang="en-US" sz="2800" spc="-10" dirty="0">
+                <a:latin typeface="Calibri"/>
+                <a:cs typeface="Calibri"/>
+              </a:rPr>
+              <a:t>:</a:t>
+            </a:r>
+          </a:p>
+        </p:txBody>
+      </p:sp>
+      <p:graphicFrame>
+        <p:nvGraphicFramePr>
+          <p:cNvPr id="5" name="Table 4">
+            <a:extLst>
+              <a:ext uri="{FF2B5EF4-FFF2-40B4-BE49-F238E27FC236}">
+                <a16:creationId xmlns:a16="http://schemas.microsoft.com/office/drawing/2014/main" id="{358193B3-405F-D2B3-3406-E410BAE76046}"/>
+              </a:ext>
+            </a:extLst>
+          </p:cNvPr>
+          <p:cNvGraphicFramePr>
+            <a:graphicFrameLocks noGrp="1"/>
+          </p:cNvGraphicFramePr>
+          <p:nvPr>
+            <p:extLst>
+              <p:ext uri="{D42A27DB-BD31-4B8C-83A1-F6EECF244321}">
+                <p14:modId xmlns:p14="http://schemas.microsoft.com/office/powerpoint/2010/main" val="658500543"/>
+              </p:ext>
+            </p:extLst>
+          </p:nvPr>
+        </p:nvGraphicFramePr>
+        <p:xfrm>
+          <a:off x="5181600" y="1752600"/>
+          <a:ext cx="2997200" cy="3708400"/>
+        </p:xfrm>
+        <a:graphic>
+          <a:graphicData uri="http://schemas.openxmlformats.org/drawingml/2006/table">
+            <a:tbl>
+              <a:tblPr firstRow="1" bandRow="1">
+                <a:tableStyleId>{5C22544A-7EE6-4342-B048-85BDC9FD1C3A}</a:tableStyleId>
+              </a:tblPr>
+              <a:tblGrid>
+                <a:gridCol w="1498600">
+                  <a:extLst>
+                    <a:ext uri="{9D8B030D-6E8A-4147-A177-3AD203B41FA5}">
+                      <a16:colId xmlns:a16="http://schemas.microsoft.com/office/drawing/2014/main" val="810151604"/>
+                    </a:ext>
+                  </a:extLst>
+                </a:gridCol>
+                <a:gridCol w="1498600">
+                  <a:extLst>
+                    <a:ext uri="{9D8B030D-6E8A-4147-A177-3AD203B41FA5}">
+                      <a16:colId xmlns:a16="http://schemas.microsoft.com/office/drawing/2014/main" val="2303540531"/>
+                    </a:ext>
+                  </a:extLst>
+                </a:gridCol>
+              </a:tblGrid>
+              <a:tr h="370840">
+                <a:tc>
+                  <a:txBody>
+                    <a:bodyPr/>
+                    <a:lstStyle/>
+                    <a:p>
+                      <a:r>
+                        <a:rPr lang="en-US" dirty="0"/>
+                        <a:t>Feature</a:t>
+                      </a:r>
+                    </a:p>
+                  </a:txBody>
+                  <a:tcPr/>
+                </a:tc>
+                <a:tc>
+                  <a:txBody>
+                    <a:bodyPr/>
+                    <a:lstStyle/>
+                    <a:p>
+                      <a:r>
+                        <a:rPr lang="en-US" dirty="0"/>
+                        <a:t>Data type</a:t>
+                      </a:r>
+                    </a:p>
+                  </a:txBody>
+                  <a:tcPr/>
+                </a:tc>
+                <a:extLst>
+                  <a:ext uri="{0D108BD9-81ED-4DB2-BD59-A6C34878D82A}">
+                    <a16:rowId xmlns:a16="http://schemas.microsoft.com/office/drawing/2014/main" val="4271622442"/>
+                  </a:ext>
+                </a:extLst>
+              </a:tr>
+              <a:tr h="370840">
+                <a:tc>
+                  <a:txBody>
+                    <a:bodyPr/>
+                    <a:lstStyle/>
+                    <a:p>
+                      <a:r>
+                        <a:rPr lang="en-US" dirty="0"/>
+                        <a:t>‘f0’</a:t>
+                      </a:r>
+                    </a:p>
+                  </a:txBody>
+                  <a:tcPr/>
+                </a:tc>
+                <a:tc>
+                  <a:txBody>
+                    <a:bodyPr/>
+                    <a:lstStyle/>
+                    <a:p>
+                      <a:r>
+                        <a:rPr lang="en-US" dirty="0"/>
+                        <a:t>float32</a:t>
+                      </a:r>
+                    </a:p>
+                  </a:txBody>
+                  <a:tcPr/>
+                </a:tc>
+                <a:extLst>
+                  <a:ext uri="{0D108BD9-81ED-4DB2-BD59-A6C34878D82A}">
+                    <a16:rowId xmlns:a16="http://schemas.microsoft.com/office/drawing/2014/main" val="2253878935"/>
+                  </a:ext>
+                </a:extLst>
+              </a:tr>
+              <a:tr h="370840">
+                <a:tc>
+                  <a:txBody>
+                    <a:bodyPr/>
+                    <a:lstStyle/>
+                    <a:p>
+                      <a:r>
+                        <a:rPr lang="en-US" dirty="0"/>
+                        <a:t>‘f1’</a:t>
+                      </a:r>
+                    </a:p>
+                  </a:txBody>
+                  <a:tcPr/>
+                </a:tc>
+                <a:tc>
+                  <a:txBody>
+                    <a:bodyPr/>
+                    <a:lstStyle/>
+                    <a:p>
+                      <a:pPr marL="0" marR="0" lvl="0" indent="0" defTabSz="914400" eaLnBrk="1" fontAlgn="auto" latinLnBrk="0" hangingPunct="1">
+                        <a:lnSpc>
+                          <a:spcPct val="100000"/>
+                        </a:lnSpc>
+                        <a:spcBef>
+                          <a:spcPts val="0"/>
+                        </a:spcBef>
+                        <a:spcAft>
+                          <a:spcPts val="0"/>
+                        </a:spcAft>
+                        <a:buClrTx/>
+                        <a:buSzTx/>
+                        <a:buFontTx/>
+                        <a:buNone/>
+                        <a:tabLst/>
+                        <a:defRPr/>
+                      </a:pPr>
+                      <a:r>
+                        <a:rPr lang="en-US" dirty="0"/>
+                        <a:t>float32</a:t>
+                      </a:r>
+                    </a:p>
+                  </a:txBody>
+                  <a:tcPr/>
+                </a:tc>
+                <a:extLst>
+                  <a:ext uri="{0D108BD9-81ED-4DB2-BD59-A6C34878D82A}">
+                    <a16:rowId xmlns:a16="http://schemas.microsoft.com/office/drawing/2014/main" val="92658091"/>
+                  </a:ext>
+                </a:extLst>
+              </a:tr>
+              <a:tr h="370840">
+                <a:tc>
+                  <a:txBody>
+                    <a:bodyPr/>
+                    <a:lstStyle/>
+                    <a:p>
+                      <a:r>
+                        <a:rPr lang="en-US" dirty="0"/>
+                        <a:t>‘f2’</a:t>
+                      </a:r>
+                    </a:p>
+                  </a:txBody>
+                  <a:tcPr/>
+                </a:tc>
+                <a:tc>
+                  <a:txBody>
+                    <a:bodyPr/>
+                    <a:lstStyle/>
+                    <a:p>
+                      <a:pPr marL="0" marR="0" lvl="0" indent="0" defTabSz="914400" eaLnBrk="1" fontAlgn="auto" latinLnBrk="0" hangingPunct="1">
+                        <a:lnSpc>
+                          <a:spcPct val="100000"/>
+                        </a:lnSpc>
+                        <a:spcBef>
+                          <a:spcPts val="0"/>
+                        </a:spcBef>
+                        <a:spcAft>
+                          <a:spcPts val="0"/>
+                        </a:spcAft>
+                        <a:buClrTx/>
+                        <a:buSzTx/>
+                        <a:buFontTx/>
+                        <a:buNone/>
+                        <a:tabLst/>
+                        <a:defRPr/>
+                      </a:pPr>
+                      <a:r>
+                        <a:rPr lang="en-US" dirty="0"/>
+                        <a:t>float32</a:t>
+                      </a:r>
+                    </a:p>
+                  </a:txBody>
+                  <a:tcPr/>
+                </a:tc>
+                <a:extLst>
+                  <a:ext uri="{0D108BD9-81ED-4DB2-BD59-A6C34878D82A}">
+                    <a16:rowId xmlns:a16="http://schemas.microsoft.com/office/drawing/2014/main" val="3623191084"/>
+                  </a:ext>
+                </a:extLst>
+              </a:tr>
+              <a:tr h="370840">
+                <a:tc>
+                  <a:txBody>
+                    <a:bodyPr/>
+                    <a:lstStyle/>
+                    <a:p>
+                      <a:r>
+                        <a:rPr lang="en-US" dirty="0"/>
+                        <a:t>‘f3’</a:t>
+                      </a:r>
+                    </a:p>
+                  </a:txBody>
+                  <a:tcPr/>
+                </a:tc>
+                <a:tc>
+                  <a:txBody>
+                    <a:bodyPr/>
+                    <a:lstStyle/>
+                    <a:p>
+                      <a:pPr marL="0" marR="0" lvl="0" indent="0" defTabSz="914400" eaLnBrk="1" fontAlgn="auto" latinLnBrk="0" hangingPunct="1">
+                        <a:lnSpc>
+                          <a:spcPct val="100000"/>
+                        </a:lnSpc>
+                        <a:spcBef>
+                          <a:spcPts val="0"/>
+                        </a:spcBef>
+                        <a:spcAft>
+                          <a:spcPts val="0"/>
+                        </a:spcAft>
+                        <a:buClrTx/>
+                        <a:buSzTx/>
+                        <a:buFontTx/>
+                        <a:buNone/>
+                        <a:tabLst/>
+                        <a:defRPr/>
+                      </a:pPr>
+                      <a:r>
+                        <a:rPr lang="en-US" dirty="0"/>
+                        <a:t>float32</a:t>
+                      </a:r>
+                    </a:p>
+                  </a:txBody>
+                  <a:tcPr/>
+                </a:tc>
+                <a:extLst>
+                  <a:ext uri="{0D108BD9-81ED-4DB2-BD59-A6C34878D82A}">
+                    <a16:rowId xmlns:a16="http://schemas.microsoft.com/office/drawing/2014/main" val="2823786994"/>
+                  </a:ext>
+                </a:extLst>
+              </a:tr>
+              <a:tr h="370840">
+                <a:tc>
+                  <a:txBody>
+                    <a:bodyPr/>
+                    <a:lstStyle/>
+                    <a:p>
+                      <a:r>
+                        <a:rPr lang="en-US" dirty="0"/>
+                        <a:t>‘f4’</a:t>
+                      </a:r>
+                    </a:p>
+                  </a:txBody>
+                  <a:tcPr/>
+                </a:tc>
+                <a:tc>
+                  <a:txBody>
+                    <a:bodyPr/>
+                    <a:lstStyle/>
+                    <a:p>
+                      <a:pPr marL="0" marR="0" lvl="0" indent="0" defTabSz="914400" eaLnBrk="1" fontAlgn="auto" latinLnBrk="0" hangingPunct="1">
+                        <a:lnSpc>
+                          <a:spcPct val="100000"/>
+                        </a:lnSpc>
+                        <a:spcBef>
+                          <a:spcPts val="0"/>
+                        </a:spcBef>
+                        <a:spcAft>
+                          <a:spcPts val="0"/>
+                        </a:spcAft>
+                        <a:buClrTx/>
+                        <a:buSzTx/>
+                        <a:buFontTx/>
+                        <a:buNone/>
+                        <a:tabLst/>
+                        <a:defRPr/>
+                      </a:pPr>
+                      <a:r>
+                        <a:rPr lang="en-US" dirty="0"/>
+                        <a:t>float32</a:t>
+                      </a:r>
+                    </a:p>
+                  </a:txBody>
+                  <a:tcPr/>
+                </a:tc>
+                <a:extLst>
+                  <a:ext uri="{0D108BD9-81ED-4DB2-BD59-A6C34878D82A}">
+                    <a16:rowId xmlns:a16="http://schemas.microsoft.com/office/drawing/2014/main" val="19432452"/>
+                  </a:ext>
+                </a:extLst>
+              </a:tr>
+              <a:tr h="370840">
+                <a:tc>
+                  <a:txBody>
+                    <a:bodyPr/>
+                    <a:lstStyle/>
+                    <a:p>
+                      <a:r>
+                        <a:rPr lang="en-US" dirty="0"/>
+                        <a:t>‘f5’</a:t>
+                      </a:r>
+                    </a:p>
+                  </a:txBody>
+                  <a:tcPr/>
+                </a:tc>
+                <a:tc>
+                  <a:txBody>
+                    <a:bodyPr/>
+                    <a:lstStyle/>
+                    <a:p>
+                      <a:pPr marL="0" marR="0" lvl="0" indent="0" defTabSz="914400" eaLnBrk="1" fontAlgn="auto" latinLnBrk="0" hangingPunct="1">
+                        <a:lnSpc>
+                          <a:spcPct val="100000"/>
+                        </a:lnSpc>
+                        <a:spcBef>
+                          <a:spcPts val="0"/>
+                        </a:spcBef>
+                        <a:spcAft>
+                          <a:spcPts val="0"/>
+                        </a:spcAft>
+                        <a:buClrTx/>
+                        <a:buSzTx/>
+                        <a:buFontTx/>
+                        <a:buNone/>
+                        <a:tabLst/>
+                        <a:defRPr/>
+                      </a:pPr>
+                      <a:r>
+                        <a:rPr lang="en-US" dirty="0"/>
+                        <a:t>float32</a:t>
+                      </a:r>
+                    </a:p>
+                  </a:txBody>
+                  <a:tcPr/>
+                </a:tc>
+                <a:extLst>
+                  <a:ext uri="{0D108BD9-81ED-4DB2-BD59-A6C34878D82A}">
+                    <a16:rowId xmlns:a16="http://schemas.microsoft.com/office/drawing/2014/main" val="3312505357"/>
+                  </a:ext>
+                </a:extLst>
+              </a:tr>
+              <a:tr h="370840">
+                <a:tc>
+                  <a:txBody>
+                    <a:bodyPr/>
+                    <a:lstStyle/>
+                    <a:p>
+                      <a:r>
+                        <a:rPr lang="en-US" dirty="0"/>
+                        <a:t>‘f6’</a:t>
+                      </a:r>
+                    </a:p>
+                  </a:txBody>
+                  <a:tcPr/>
+                </a:tc>
+                <a:tc>
+                  <a:txBody>
+                    <a:bodyPr/>
+                    <a:lstStyle/>
+                    <a:p>
+                      <a:pPr marL="0" marR="0" lvl="0" indent="0" defTabSz="914400" eaLnBrk="1" fontAlgn="auto" latinLnBrk="0" hangingPunct="1">
+                        <a:lnSpc>
+                          <a:spcPct val="100000"/>
+                        </a:lnSpc>
+                        <a:spcBef>
+                          <a:spcPts val="0"/>
+                        </a:spcBef>
+                        <a:spcAft>
+                          <a:spcPts val="0"/>
+                        </a:spcAft>
+                        <a:buClrTx/>
+                        <a:buSzTx/>
+                        <a:buFontTx/>
+                        <a:buNone/>
+                        <a:tabLst/>
+                        <a:defRPr/>
+                      </a:pPr>
+                      <a:r>
+                        <a:rPr lang="en-US" dirty="0"/>
+                        <a:t>float32</a:t>
+                      </a:r>
+                    </a:p>
+                  </a:txBody>
+                  <a:tcPr/>
+                </a:tc>
+                <a:extLst>
+                  <a:ext uri="{0D108BD9-81ED-4DB2-BD59-A6C34878D82A}">
+                    <a16:rowId xmlns:a16="http://schemas.microsoft.com/office/drawing/2014/main" val="1381536708"/>
+                  </a:ext>
+                </a:extLst>
+              </a:tr>
+              <a:tr h="370840">
+                <a:tc>
+                  <a:txBody>
+                    <a:bodyPr/>
+                    <a:lstStyle/>
+                    <a:p>
+                      <a:r>
+                        <a:rPr lang="en-US" dirty="0"/>
+                        <a:t>‘f7’</a:t>
+                      </a:r>
+                    </a:p>
+                  </a:txBody>
+                  <a:tcPr/>
+                </a:tc>
+                <a:tc>
+                  <a:txBody>
+                    <a:bodyPr/>
+                    <a:lstStyle/>
+                    <a:p>
+                      <a:pPr marL="0" marR="0" lvl="0" indent="0" defTabSz="914400" eaLnBrk="1" fontAlgn="auto" latinLnBrk="0" hangingPunct="1">
+                        <a:lnSpc>
+                          <a:spcPct val="100000"/>
+                        </a:lnSpc>
+                        <a:spcBef>
+                          <a:spcPts val="0"/>
+                        </a:spcBef>
+                        <a:spcAft>
+                          <a:spcPts val="0"/>
+                        </a:spcAft>
+                        <a:buClrTx/>
+                        <a:buSzTx/>
+                        <a:buFontTx/>
+                        <a:buNone/>
+                        <a:tabLst/>
+                        <a:defRPr/>
+                      </a:pPr>
+                      <a:r>
+                        <a:rPr lang="en-US" dirty="0"/>
+                        <a:t>float32</a:t>
+                      </a:r>
+                    </a:p>
+                  </a:txBody>
+                  <a:tcPr/>
+                </a:tc>
+                <a:extLst>
+                  <a:ext uri="{0D108BD9-81ED-4DB2-BD59-A6C34878D82A}">
+                    <a16:rowId xmlns:a16="http://schemas.microsoft.com/office/drawing/2014/main" val="3939221105"/>
+                  </a:ext>
+                </a:extLst>
+              </a:tr>
+              <a:tr h="370840">
+                <a:tc>
+                  <a:txBody>
+                    <a:bodyPr/>
+                    <a:lstStyle/>
+                    <a:p>
+                      <a:r>
+                        <a:rPr lang="en-US" dirty="0"/>
+                        <a:t>‘class’</a:t>
+                      </a:r>
+                    </a:p>
+                  </a:txBody>
+                  <a:tcPr/>
+                </a:tc>
+                <a:tc>
+                  <a:txBody>
+                    <a:bodyPr/>
+                    <a:lstStyle/>
+                    <a:p>
+                      <a:pPr marL="0" marR="0" lvl="0" indent="0" defTabSz="914400" eaLnBrk="1" fontAlgn="auto" latinLnBrk="0" hangingPunct="1">
+                        <a:lnSpc>
+                          <a:spcPct val="100000"/>
+                        </a:lnSpc>
+                        <a:spcBef>
+                          <a:spcPts val="0"/>
+                        </a:spcBef>
+                        <a:spcAft>
+                          <a:spcPts val="0"/>
+                        </a:spcAft>
+                        <a:buClrTx/>
+                        <a:buSzTx/>
+                        <a:buFontTx/>
+                        <a:buNone/>
+                        <a:tabLst/>
+                        <a:defRPr/>
+                      </a:pPr>
+                      <a:r>
+                        <a:rPr lang="en-US" dirty="0"/>
+                        <a:t>float32</a:t>
+                      </a:r>
+                    </a:p>
+                  </a:txBody>
+                  <a:tcPr/>
+                </a:tc>
+                <a:extLst>
+                  <a:ext uri="{0D108BD9-81ED-4DB2-BD59-A6C34878D82A}">
+                    <a16:rowId xmlns:a16="http://schemas.microsoft.com/office/drawing/2014/main" val="2208822470"/>
+                  </a:ext>
+                </a:extLst>
+              </a:tr>
+            </a:tbl>
+          </a:graphicData>
+        </a:graphic>
+      </p:graphicFrame>
+      <p:sp>
+        <p:nvSpPr>
+          <p:cNvPr id="6" name="TextBox 5">
+            <a:extLst>
+              <a:ext uri="{FF2B5EF4-FFF2-40B4-BE49-F238E27FC236}">
+                <a16:creationId xmlns:a16="http://schemas.microsoft.com/office/drawing/2014/main" id="{7C7B1F52-8188-C034-B6D2-BA4DD98BF433}"/>
+              </a:ext>
+            </a:extLst>
+          </p:cNvPr>
+          <p:cNvSpPr txBox="1"/>
+          <p:nvPr/>
+        </p:nvSpPr>
+        <p:spPr>
+          <a:xfrm>
+            <a:off x="3048000" y="2136570"/>
+            <a:ext cx="1600200" cy="307777"/>
+          </a:xfrm>
+          <a:prstGeom prst="rect">
+            <a:avLst/>
+          </a:prstGeom>
+          <a:noFill/>
+        </p:spPr>
+        <p:txBody>
+          <a:bodyPr wrap="square" rtlCol="0">
+            <a:spAutoFit/>
+          </a:bodyPr>
+          <a:lstStyle/>
+          <a:p>
+            <a:r>
+              <a:rPr lang="en-US" sz="1400" dirty="0"/>
+              <a:t>Mean of means</a:t>
+            </a:r>
+          </a:p>
+        </p:txBody>
+      </p:sp>
+      <p:sp>
+        <p:nvSpPr>
+          <p:cNvPr id="9" name="TextBox 8">
+            <a:extLst>
+              <a:ext uri="{FF2B5EF4-FFF2-40B4-BE49-F238E27FC236}">
+                <a16:creationId xmlns:a16="http://schemas.microsoft.com/office/drawing/2014/main" id="{077CD7A0-F2A9-3596-0CB0-2D39606255C2}"/>
+              </a:ext>
+            </a:extLst>
+          </p:cNvPr>
+          <p:cNvSpPr txBox="1"/>
+          <p:nvPr/>
+        </p:nvSpPr>
+        <p:spPr>
+          <a:xfrm>
+            <a:off x="2971800" y="2484798"/>
+            <a:ext cx="1676400" cy="307777"/>
+          </a:xfrm>
+          <a:prstGeom prst="rect">
+            <a:avLst/>
+          </a:prstGeom>
+          <a:noFill/>
+        </p:spPr>
+        <p:txBody>
+          <a:bodyPr wrap="square" rtlCol="0">
+            <a:spAutoFit/>
+          </a:bodyPr>
+          <a:lstStyle/>
+          <a:p>
+            <a:r>
+              <a:rPr lang="en-US" sz="1400" dirty="0"/>
+              <a:t>Std dev of means</a:t>
+            </a:r>
+          </a:p>
+        </p:txBody>
+      </p:sp>
+      <p:cxnSp>
+        <p:nvCxnSpPr>
+          <p:cNvPr id="10" name="Straight Arrow Connector 9">
+            <a:extLst>
+              <a:ext uri="{FF2B5EF4-FFF2-40B4-BE49-F238E27FC236}">
+                <a16:creationId xmlns:a16="http://schemas.microsoft.com/office/drawing/2014/main" id="{AA4176CE-F022-5CAD-6A17-49B594D72D23}"/>
+              </a:ext>
+            </a:extLst>
+          </p:cNvPr>
+          <p:cNvCxnSpPr>
+            <a:cxnSpLocks/>
+          </p:cNvCxnSpPr>
+          <p:nvPr/>
+        </p:nvCxnSpPr>
+        <p:spPr>
+          <a:xfrm>
+            <a:off x="4407917" y="2314936"/>
+            <a:ext cx="679195" cy="0"/>
+          </a:xfrm>
+          <a:prstGeom prst="straightConnector1">
+            <a:avLst/>
+          </a:prstGeom>
+          <a:ln>
+            <a:tailEnd type="triangle"/>
+          </a:ln>
+        </p:spPr>
+        <p:style>
+          <a:lnRef idx="1">
+            <a:schemeClr val="accent1"/>
+          </a:lnRef>
+          <a:fillRef idx="0">
+            <a:schemeClr val="accent1"/>
+          </a:fillRef>
+          <a:effectRef idx="0">
+            <a:schemeClr val="accent1"/>
+          </a:effectRef>
+          <a:fontRef idx="minor">
+            <a:schemeClr val="tx1"/>
+          </a:fontRef>
+        </p:style>
+      </p:cxnSp>
+      <p:cxnSp>
+        <p:nvCxnSpPr>
+          <p:cNvPr id="17" name="Straight Arrow Connector 16">
+            <a:extLst>
+              <a:ext uri="{FF2B5EF4-FFF2-40B4-BE49-F238E27FC236}">
+                <a16:creationId xmlns:a16="http://schemas.microsoft.com/office/drawing/2014/main" id="{11DB0278-72FA-4BBE-20C6-407532BE50CC}"/>
+              </a:ext>
+            </a:extLst>
+          </p:cNvPr>
+          <p:cNvCxnSpPr>
+            <a:cxnSpLocks/>
+          </p:cNvCxnSpPr>
+          <p:nvPr/>
+        </p:nvCxnSpPr>
+        <p:spPr>
+          <a:xfrm>
+            <a:off x="4511040" y="2652508"/>
+            <a:ext cx="576072" cy="756"/>
+          </a:xfrm>
+          <a:prstGeom prst="straightConnector1">
+            <a:avLst/>
+          </a:prstGeom>
+          <a:ln>
+            <a:tailEnd type="triangle"/>
+          </a:ln>
+        </p:spPr>
+        <p:style>
+          <a:lnRef idx="1">
+            <a:schemeClr val="accent1"/>
+          </a:lnRef>
+          <a:fillRef idx="0">
+            <a:schemeClr val="accent1"/>
+          </a:fillRef>
+          <a:effectRef idx="0">
+            <a:schemeClr val="accent1"/>
+          </a:effectRef>
+          <a:fontRef idx="minor">
+            <a:schemeClr val="tx1"/>
+          </a:fontRef>
+        </p:style>
+      </p:cxnSp>
+      <p:sp>
+        <p:nvSpPr>
+          <p:cNvPr id="19" name="TextBox 18">
+            <a:extLst>
+              <a:ext uri="{FF2B5EF4-FFF2-40B4-BE49-F238E27FC236}">
+                <a16:creationId xmlns:a16="http://schemas.microsoft.com/office/drawing/2014/main" id="{82D17B9E-BE66-CD7D-45BC-C26460519B4F}"/>
+              </a:ext>
+            </a:extLst>
+          </p:cNvPr>
+          <p:cNvSpPr txBox="1"/>
+          <p:nvPr/>
+        </p:nvSpPr>
+        <p:spPr>
+          <a:xfrm>
+            <a:off x="2895600" y="2885583"/>
+            <a:ext cx="1752600" cy="307777"/>
+          </a:xfrm>
+          <a:prstGeom prst="rect">
+            <a:avLst/>
+          </a:prstGeom>
+          <a:noFill/>
+        </p:spPr>
+        <p:txBody>
+          <a:bodyPr wrap="square" rtlCol="0">
+            <a:spAutoFit/>
+          </a:bodyPr>
+          <a:lstStyle/>
+          <a:p>
+            <a:r>
+              <a:rPr lang="en-US" sz="1400" dirty="0"/>
+              <a:t>Mean of std devs</a:t>
+            </a:r>
+          </a:p>
+        </p:txBody>
+      </p:sp>
+      <p:sp>
+        <p:nvSpPr>
+          <p:cNvPr id="20" name="TextBox 19">
+            <a:extLst>
+              <a:ext uri="{FF2B5EF4-FFF2-40B4-BE49-F238E27FC236}">
+                <a16:creationId xmlns:a16="http://schemas.microsoft.com/office/drawing/2014/main" id="{E78D638E-2A7B-D26B-64EB-7BC9E957DB90}"/>
+              </a:ext>
+            </a:extLst>
+          </p:cNvPr>
+          <p:cNvSpPr txBox="1"/>
+          <p:nvPr/>
+        </p:nvSpPr>
+        <p:spPr>
+          <a:xfrm>
+            <a:off x="2819400" y="3233811"/>
+            <a:ext cx="1828800" cy="307777"/>
+          </a:xfrm>
+          <a:prstGeom prst="rect">
+            <a:avLst/>
+          </a:prstGeom>
+          <a:noFill/>
+        </p:spPr>
+        <p:txBody>
+          <a:bodyPr wrap="square" rtlCol="0">
+            <a:spAutoFit/>
+          </a:bodyPr>
+          <a:lstStyle/>
+          <a:p>
+            <a:r>
+              <a:rPr lang="en-US" sz="1400" dirty="0"/>
+              <a:t>Std dev of std devs</a:t>
+            </a:r>
+          </a:p>
+        </p:txBody>
+      </p:sp>
+      <p:cxnSp>
+        <p:nvCxnSpPr>
+          <p:cNvPr id="21" name="Straight Arrow Connector 20">
+            <a:extLst>
+              <a:ext uri="{FF2B5EF4-FFF2-40B4-BE49-F238E27FC236}">
+                <a16:creationId xmlns:a16="http://schemas.microsoft.com/office/drawing/2014/main" id="{0F6FE3F7-2BB1-904F-5B22-F54FB2714934}"/>
+              </a:ext>
+            </a:extLst>
+          </p:cNvPr>
+          <p:cNvCxnSpPr>
+            <a:cxnSpLocks/>
+          </p:cNvCxnSpPr>
+          <p:nvPr/>
+        </p:nvCxnSpPr>
+        <p:spPr>
+          <a:xfrm>
+            <a:off x="4407917" y="3063949"/>
+            <a:ext cx="679195" cy="0"/>
+          </a:xfrm>
+          <a:prstGeom prst="straightConnector1">
+            <a:avLst/>
+          </a:prstGeom>
+          <a:ln>
+            <a:tailEnd type="triangle"/>
+          </a:ln>
+        </p:spPr>
+        <p:style>
+          <a:lnRef idx="1">
+            <a:schemeClr val="accent1"/>
+          </a:lnRef>
+          <a:fillRef idx="0">
+            <a:schemeClr val="accent1"/>
+          </a:fillRef>
+          <a:effectRef idx="0">
+            <a:schemeClr val="accent1"/>
+          </a:effectRef>
+          <a:fontRef idx="minor">
+            <a:schemeClr val="tx1"/>
+          </a:fontRef>
+        </p:style>
+      </p:cxnSp>
+      <p:cxnSp>
+        <p:nvCxnSpPr>
+          <p:cNvPr id="22" name="Straight Arrow Connector 21">
+            <a:extLst>
+              <a:ext uri="{FF2B5EF4-FFF2-40B4-BE49-F238E27FC236}">
+                <a16:creationId xmlns:a16="http://schemas.microsoft.com/office/drawing/2014/main" id="{913CB35E-3BC2-AEC0-AF3E-3ACFA4073D49}"/>
+              </a:ext>
+            </a:extLst>
+          </p:cNvPr>
+          <p:cNvCxnSpPr>
+            <a:cxnSpLocks/>
+          </p:cNvCxnSpPr>
+          <p:nvPr/>
+        </p:nvCxnSpPr>
+        <p:spPr>
+          <a:xfrm>
+            <a:off x="4511040" y="3401521"/>
+            <a:ext cx="576072" cy="756"/>
+          </a:xfrm>
+          <a:prstGeom prst="straightConnector1">
+            <a:avLst/>
+          </a:prstGeom>
+          <a:ln>
+            <a:tailEnd type="triangle"/>
+          </a:ln>
+        </p:spPr>
+        <p:style>
+          <a:lnRef idx="1">
+            <a:schemeClr val="accent1"/>
+          </a:lnRef>
+          <a:fillRef idx="0">
+            <a:schemeClr val="accent1"/>
+          </a:fillRef>
+          <a:effectRef idx="0">
+            <a:schemeClr val="accent1"/>
+          </a:effectRef>
+          <a:fontRef idx="minor">
+            <a:schemeClr val="tx1"/>
+          </a:fontRef>
+        </p:style>
+      </p:cxnSp>
+      <p:sp>
+        <p:nvSpPr>
+          <p:cNvPr id="23" name="TextBox 22">
+            <a:extLst>
+              <a:ext uri="{FF2B5EF4-FFF2-40B4-BE49-F238E27FC236}">
+                <a16:creationId xmlns:a16="http://schemas.microsoft.com/office/drawing/2014/main" id="{7E2FFA68-EE07-19A3-2726-55C1B77D6B48}"/>
+              </a:ext>
+            </a:extLst>
+          </p:cNvPr>
+          <p:cNvSpPr txBox="1"/>
+          <p:nvPr/>
+        </p:nvSpPr>
+        <p:spPr>
+          <a:xfrm>
+            <a:off x="2971800" y="3610438"/>
+            <a:ext cx="1676400" cy="307777"/>
+          </a:xfrm>
+          <a:prstGeom prst="rect">
+            <a:avLst/>
+          </a:prstGeom>
+          <a:noFill/>
+        </p:spPr>
+        <p:txBody>
+          <a:bodyPr wrap="square" rtlCol="0">
+            <a:spAutoFit/>
+          </a:bodyPr>
+          <a:lstStyle/>
+          <a:p>
+            <a:r>
+              <a:rPr lang="en-US" sz="1400" dirty="0"/>
+              <a:t>Mean of kurtosis</a:t>
+            </a:r>
+          </a:p>
+        </p:txBody>
+      </p:sp>
+      <p:sp>
+        <p:nvSpPr>
+          <p:cNvPr id="24" name="TextBox 23">
+            <a:extLst>
+              <a:ext uri="{FF2B5EF4-FFF2-40B4-BE49-F238E27FC236}">
+                <a16:creationId xmlns:a16="http://schemas.microsoft.com/office/drawing/2014/main" id="{614BC076-95C6-13B0-57DC-F8A8DA3A7B9D}"/>
+              </a:ext>
+            </a:extLst>
+          </p:cNvPr>
+          <p:cNvSpPr txBox="1"/>
+          <p:nvPr/>
+        </p:nvSpPr>
+        <p:spPr>
+          <a:xfrm>
+            <a:off x="2895600" y="3958666"/>
+            <a:ext cx="1752600" cy="307777"/>
+          </a:xfrm>
+          <a:prstGeom prst="rect">
+            <a:avLst/>
+          </a:prstGeom>
+          <a:noFill/>
+        </p:spPr>
+        <p:txBody>
+          <a:bodyPr wrap="square" rtlCol="0">
+            <a:spAutoFit/>
+          </a:bodyPr>
+          <a:lstStyle/>
+          <a:p>
+            <a:r>
+              <a:rPr lang="en-US" sz="1400" dirty="0"/>
+              <a:t>Std dev of kurtosis</a:t>
+            </a:r>
+          </a:p>
+        </p:txBody>
+      </p:sp>
+      <p:cxnSp>
+        <p:nvCxnSpPr>
+          <p:cNvPr id="25" name="Straight Arrow Connector 24">
+            <a:extLst>
+              <a:ext uri="{FF2B5EF4-FFF2-40B4-BE49-F238E27FC236}">
+                <a16:creationId xmlns:a16="http://schemas.microsoft.com/office/drawing/2014/main" id="{85F4FC67-0A69-883D-2619-DAE16AC60612}"/>
+              </a:ext>
+            </a:extLst>
+          </p:cNvPr>
+          <p:cNvCxnSpPr>
+            <a:cxnSpLocks/>
+          </p:cNvCxnSpPr>
+          <p:nvPr/>
+        </p:nvCxnSpPr>
+        <p:spPr>
+          <a:xfrm>
+            <a:off x="4407917" y="3788804"/>
+            <a:ext cx="679195" cy="0"/>
+          </a:xfrm>
+          <a:prstGeom prst="straightConnector1">
+            <a:avLst/>
+          </a:prstGeom>
+          <a:ln>
+            <a:tailEnd type="triangle"/>
+          </a:ln>
+        </p:spPr>
+        <p:style>
+          <a:lnRef idx="1">
+            <a:schemeClr val="accent1"/>
+          </a:lnRef>
+          <a:fillRef idx="0">
+            <a:schemeClr val="accent1"/>
+          </a:fillRef>
+          <a:effectRef idx="0">
+            <a:schemeClr val="accent1"/>
+          </a:effectRef>
+          <a:fontRef idx="minor">
+            <a:schemeClr val="tx1"/>
+          </a:fontRef>
+        </p:style>
+      </p:cxnSp>
+      <p:cxnSp>
+        <p:nvCxnSpPr>
+          <p:cNvPr id="26" name="Straight Arrow Connector 25">
+            <a:extLst>
+              <a:ext uri="{FF2B5EF4-FFF2-40B4-BE49-F238E27FC236}">
+                <a16:creationId xmlns:a16="http://schemas.microsoft.com/office/drawing/2014/main" id="{C821055B-F0E1-7275-377F-1FDCD010499A}"/>
+              </a:ext>
+            </a:extLst>
+          </p:cNvPr>
+          <p:cNvCxnSpPr>
+            <a:cxnSpLocks/>
+          </p:cNvCxnSpPr>
+          <p:nvPr/>
+        </p:nvCxnSpPr>
+        <p:spPr>
+          <a:xfrm>
+            <a:off x="4511040" y="4126376"/>
+            <a:ext cx="576072" cy="756"/>
+          </a:xfrm>
+          <a:prstGeom prst="straightConnector1">
+            <a:avLst/>
+          </a:prstGeom>
+          <a:ln>
+            <a:tailEnd type="triangle"/>
+          </a:ln>
+        </p:spPr>
+        <p:style>
+          <a:lnRef idx="1">
+            <a:schemeClr val="accent1"/>
+          </a:lnRef>
+          <a:fillRef idx="0">
+            <a:schemeClr val="accent1"/>
+          </a:fillRef>
+          <a:effectRef idx="0">
+            <a:schemeClr val="accent1"/>
+          </a:effectRef>
+          <a:fontRef idx="minor">
+            <a:schemeClr val="tx1"/>
+          </a:fontRef>
+        </p:style>
+      </p:cxnSp>
+      <p:sp>
+        <p:nvSpPr>
+          <p:cNvPr id="27" name="TextBox 26">
+            <a:extLst>
+              <a:ext uri="{FF2B5EF4-FFF2-40B4-BE49-F238E27FC236}">
+                <a16:creationId xmlns:a16="http://schemas.microsoft.com/office/drawing/2014/main" id="{6C1DD1CB-5F98-2516-CB29-A2F5B61F4651}"/>
+              </a:ext>
+            </a:extLst>
+          </p:cNvPr>
+          <p:cNvSpPr txBox="1"/>
+          <p:nvPr/>
+        </p:nvSpPr>
+        <p:spPr>
+          <a:xfrm>
+            <a:off x="3048000" y="4359451"/>
+            <a:ext cx="1600200" cy="307777"/>
+          </a:xfrm>
+          <a:prstGeom prst="rect">
+            <a:avLst/>
+          </a:prstGeom>
+          <a:noFill/>
+        </p:spPr>
+        <p:txBody>
+          <a:bodyPr wrap="square" rtlCol="0">
+            <a:spAutoFit/>
+          </a:bodyPr>
+          <a:lstStyle/>
+          <a:p>
+            <a:r>
+              <a:rPr lang="en-US" sz="1400" dirty="0"/>
+              <a:t>Mean of skews</a:t>
+            </a:r>
+          </a:p>
+        </p:txBody>
+      </p:sp>
+      <p:sp>
+        <p:nvSpPr>
+          <p:cNvPr id="28" name="TextBox 27">
+            <a:extLst>
+              <a:ext uri="{FF2B5EF4-FFF2-40B4-BE49-F238E27FC236}">
+                <a16:creationId xmlns:a16="http://schemas.microsoft.com/office/drawing/2014/main" id="{9B492551-6556-C0A4-D7C8-CCFF5885D817}"/>
+              </a:ext>
+            </a:extLst>
+          </p:cNvPr>
+          <p:cNvSpPr txBox="1"/>
+          <p:nvPr/>
+        </p:nvSpPr>
+        <p:spPr>
+          <a:xfrm>
+            <a:off x="2971800" y="4707679"/>
+            <a:ext cx="1676400" cy="307777"/>
+          </a:xfrm>
+          <a:prstGeom prst="rect">
+            <a:avLst/>
+          </a:prstGeom>
+          <a:noFill/>
+        </p:spPr>
+        <p:txBody>
+          <a:bodyPr wrap="square" rtlCol="0">
+            <a:spAutoFit/>
+          </a:bodyPr>
+          <a:lstStyle/>
+          <a:p>
+            <a:r>
+              <a:rPr lang="en-US" sz="1400" dirty="0"/>
+              <a:t>Std dev of skews</a:t>
+            </a:r>
+          </a:p>
+        </p:txBody>
+      </p:sp>
+      <p:cxnSp>
+        <p:nvCxnSpPr>
+          <p:cNvPr id="29" name="Straight Arrow Connector 28">
+            <a:extLst>
+              <a:ext uri="{FF2B5EF4-FFF2-40B4-BE49-F238E27FC236}">
+                <a16:creationId xmlns:a16="http://schemas.microsoft.com/office/drawing/2014/main" id="{F5F1ECA3-6A8D-20AD-854D-C9854DF61ADF}"/>
+              </a:ext>
+            </a:extLst>
+          </p:cNvPr>
+          <p:cNvCxnSpPr>
+            <a:cxnSpLocks/>
+          </p:cNvCxnSpPr>
+          <p:nvPr/>
+        </p:nvCxnSpPr>
+        <p:spPr>
+          <a:xfrm>
+            <a:off x="4407917" y="4537817"/>
+            <a:ext cx="679195" cy="0"/>
+          </a:xfrm>
+          <a:prstGeom prst="straightConnector1">
+            <a:avLst/>
+          </a:prstGeom>
+          <a:ln>
+            <a:tailEnd type="triangle"/>
+          </a:ln>
+        </p:spPr>
+        <p:style>
+          <a:lnRef idx="1">
+            <a:schemeClr val="accent1"/>
+          </a:lnRef>
+          <a:fillRef idx="0">
+            <a:schemeClr val="accent1"/>
+          </a:fillRef>
+          <a:effectRef idx="0">
+            <a:schemeClr val="accent1"/>
+          </a:effectRef>
+          <a:fontRef idx="minor">
+            <a:schemeClr val="tx1"/>
+          </a:fontRef>
+        </p:style>
+      </p:cxnSp>
+      <p:cxnSp>
+        <p:nvCxnSpPr>
+          <p:cNvPr id="30" name="Straight Arrow Connector 29">
+            <a:extLst>
+              <a:ext uri="{FF2B5EF4-FFF2-40B4-BE49-F238E27FC236}">
+                <a16:creationId xmlns:a16="http://schemas.microsoft.com/office/drawing/2014/main" id="{880EF39D-F77B-53D7-FB6A-372F7FB8867C}"/>
+              </a:ext>
+            </a:extLst>
+          </p:cNvPr>
+          <p:cNvCxnSpPr>
+            <a:cxnSpLocks/>
+          </p:cNvCxnSpPr>
+          <p:nvPr/>
+        </p:nvCxnSpPr>
+        <p:spPr>
+          <a:xfrm>
+            <a:off x="4511040" y="4875389"/>
+            <a:ext cx="576072" cy="756"/>
+          </a:xfrm>
+          <a:prstGeom prst="straightConnector1">
+            <a:avLst/>
+          </a:prstGeom>
+          <a:ln>
+            <a:tailEnd type="triangle"/>
+          </a:ln>
+        </p:spPr>
+        <p:style>
+          <a:lnRef idx="1">
+            <a:schemeClr val="accent1"/>
+          </a:lnRef>
+          <a:fillRef idx="0">
+            <a:schemeClr val="accent1"/>
+          </a:fillRef>
+          <a:effectRef idx="0">
+            <a:schemeClr val="accent1"/>
+          </a:effectRef>
+          <a:fontRef idx="minor">
+            <a:schemeClr val="tx1"/>
+          </a:fontRef>
+        </p:style>
+      </p:cxnSp>
+      <p:sp>
+        <p:nvSpPr>
+          <p:cNvPr id="31" name="TextBox 30">
+            <a:extLst>
+              <a:ext uri="{FF2B5EF4-FFF2-40B4-BE49-F238E27FC236}">
+                <a16:creationId xmlns:a16="http://schemas.microsoft.com/office/drawing/2014/main" id="{7134F16C-3B9E-5B48-E818-BB6678DA7C53}"/>
+              </a:ext>
+            </a:extLst>
+          </p:cNvPr>
+          <p:cNvSpPr txBox="1"/>
+          <p:nvPr/>
+        </p:nvSpPr>
+        <p:spPr>
+          <a:xfrm>
+            <a:off x="3406140" y="5108464"/>
+            <a:ext cx="1676400" cy="523220"/>
+          </a:xfrm>
+          <a:prstGeom prst="rect">
+            <a:avLst/>
+          </a:prstGeom>
+          <a:noFill/>
+        </p:spPr>
+        <p:txBody>
+          <a:bodyPr wrap="square" rtlCol="0">
+            <a:spAutoFit/>
+          </a:bodyPr>
+          <a:lstStyle/>
+          <a:p>
+            <a:r>
+              <a:rPr lang="en-US" sz="1400" dirty="0"/>
+              <a:t>Class label (sb1=0, sb2=1)</a:t>
+            </a:r>
+          </a:p>
+        </p:txBody>
+      </p:sp>
+      <p:cxnSp>
+        <p:nvCxnSpPr>
+          <p:cNvPr id="32" name="Straight Arrow Connector 31">
+            <a:extLst>
+              <a:ext uri="{FF2B5EF4-FFF2-40B4-BE49-F238E27FC236}">
+                <a16:creationId xmlns:a16="http://schemas.microsoft.com/office/drawing/2014/main" id="{0EA907CD-C015-5AEF-638E-8FC44590E455}"/>
+              </a:ext>
+            </a:extLst>
+          </p:cNvPr>
+          <p:cNvCxnSpPr>
+            <a:cxnSpLocks/>
+          </p:cNvCxnSpPr>
+          <p:nvPr/>
+        </p:nvCxnSpPr>
+        <p:spPr>
+          <a:xfrm>
+            <a:off x="4511040" y="5278419"/>
+            <a:ext cx="576072" cy="756"/>
+          </a:xfrm>
+          <a:prstGeom prst="straightConnector1">
+            <a:avLst/>
+          </a:prstGeom>
+          <a:ln>
+            <a:tailEnd type="triangle"/>
+          </a:ln>
+        </p:spPr>
+        <p:style>
+          <a:lnRef idx="1">
+            <a:schemeClr val="accent1"/>
+          </a:lnRef>
+          <a:fillRef idx="0">
+            <a:schemeClr val="accent1"/>
+          </a:fillRef>
+          <a:effectRef idx="0">
+            <a:schemeClr val="accent1"/>
+          </a:effectRef>
+          <a:fontRef idx="minor">
+            <a:schemeClr val="tx1"/>
+          </a:fontRef>
+        </p:style>
+      </p:cxnSp>
+    </p:spTree>
+    <p:extLst>
+      <p:ext uri="{BB962C8B-B14F-4D97-AF65-F5344CB8AC3E}">
+        <p14:creationId xmlns:p14="http://schemas.microsoft.com/office/powerpoint/2010/main" val="3245087066"/>
+      </p:ext>
+    </p:extLst>
   </p:cSld>
   <p:clrMapOvr>
     <a:masterClrMapping/>

</xml_diff>